<commit_message>
modified:   .DS_Store 	modified:   frontend/components/RegisterForm.jsx 	modified:   frontend/components/SpeechChatbot.jsx 	modified:   frontend/components/SpeechChatbotApply.jsx 	modified:   frontend/components/SpeechChatbotContribute.jsx 	modified:   frontend/components/SpeechChatbotDashboard.jsx 	modified:   frontend/components/TestingPage.jsx 	new file:   frontend/components/chatbot/ChatbottComponent.jsx 	modified:   frontend/pages/donate.jsx 	modified:   pitch/PitchSlide.pdf 	modified:   pitch/PitchSlide.pptx 	modified:   readme.MD
Changes not staged for commit:
	modified:   backend/aptos-python-sdk (modified content, untracked content)
</commit_message>
<xml_diff>
--- a/pitch/PitchSlide.pptx
+++ b/pitch/PitchSlide.pptx
@@ -5,14 +5,13 @@
     <p:sldMasterId id="2147483648" r:id="rId1"/>
   </p:sldMasterIdLst>
   <p:notesMasterIdLst>
-    <p:notesMasterId r:id="rId7"/>
+    <p:notesMasterId r:id="rId6"/>
   </p:notesMasterIdLst>
   <p:sldIdLst>
     <p:sldId id="263" r:id="rId2"/>
-    <p:sldId id="268" r:id="rId3"/>
-    <p:sldId id="264" r:id="rId4"/>
-    <p:sldId id="265" r:id="rId5"/>
-    <p:sldId id="269" r:id="rId6"/>
+    <p:sldId id="264" r:id="rId3"/>
+    <p:sldId id="265" r:id="rId4"/>
+    <p:sldId id="269" r:id="rId5"/>
   </p:sldIdLst>
   <p:sldSz cx="12192000" cy="6858000"/>
   <p:notesSz cx="6858000" cy="9144000"/>
@@ -627,9 +626,8 @@
             </a:pPr>
             <a:r>
               <a:rPr lang="en-US" dirty="0"/>
-              <a:t>Have you ever wondered whether Malaysia’s low income B40 category are secretly rich and are sucking government resources? This is exactly the harsh reality that Malaysia is facing.</a:t>
-            </a:r>
-            <a:endParaRPr lang="en-MY" dirty="0"/>
+              <a:t>Current government incentive platforms are not only slow, but also lack transparency. </a:t>
+            </a:r>
           </a:p>
           <a:p>
             <a:endParaRPr lang="en-US" dirty="0"/>
@@ -662,7 +660,7 @@
     </p:spTree>
     <p:extLst>
       <p:ext uri="{BB962C8B-B14F-4D97-AF65-F5344CB8AC3E}">
-        <p14:creationId xmlns:p14="http://schemas.microsoft.com/office/powerpoint/2010/main" val="551462813"/>
+        <p14:creationId xmlns:p14="http://schemas.microsoft.com/office/powerpoint/2010/main" val="1711006257"/>
       </p:ext>
     </p:extLst>
   </p:cSld>
@@ -716,30 +714,18 @@
           <a:bodyPr/>
           <a:lstStyle/>
           <a:p>
-            <a:pPr marL="0" marR="0" lvl="0" indent="0" algn="l" defTabSz="914400" rtl="0" eaLnBrk="1" fontAlgn="auto" latinLnBrk="0" hangingPunct="1">
-              <a:lnSpc>
-                <a:spcPct val="100000"/>
-              </a:lnSpc>
-              <a:spcBef>
-                <a:spcPts val="0"/>
-              </a:spcBef>
-              <a:spcAft>
-                <a:spcPts val="0"/>
-              </a:spcAft>
-              <a:buClrTx/>
-              <a:buSzTx/>
-              <a:buFontTx/>
-              <a:buNone/>
-              <a:tabLst/>
-              <a:defRPr/>
-            </a:pPr>
             <a:r>
               <a:rPr lang="en-US" dirty="0"/>
-              <a:t>Current government incentive platforms are not only slow, but also lack transparency. </a:t>
-            </a:r>
-          </a:p>
-          <a:p>
-            <a:endParaRPr lang="en-US" dirty="0"/>
+              <a:t>Introducing </a:t>
+            </a:r>
+            <a:r>
+              <a:rPr lang="en-US" dirty="0" err="1"/>
+              <a:t>GoVer</a:t>
+            </a:r>
+            <a:r>
+              <a:rPr lang="en-US" dirty="0"/>
+              <a:t>, our AI-powered blockchain government incentive platform. We leverage Aptos blockchain and inject the power of AI to make web3 easily accessible for every single Malaysian.</a:t>
+            </a:r>
           </a:p>
         </p:txBody>
       </p:sp>
@@ -769,7 +755,7 @@
     </p:spTree>
     <p:extLst>
       <p:ext uri="{BB962C8B-B14F-4D97-AF65-F5344CB8AC3E}">
-        <p14:creationId xmlns:p14="http://schemas.microsoft.com/office/powerpoint/2010/main" val="1711006257"/>
+        <p14:creationId xmlns:p14="http://schemas.microsoft.com/office/powerpoint/2010/main" val="856162272"/>
       </p:ext>
     </p:extLst>
   </p:cSld>
@@ -824,16 +810,34 @@
           <a:lstStyle/>
           <a:p>
             <a:r>
-              <a:rPr lang="en-US" dirty="0"/>
-              <a:t>Introducing </a:t>
-            </a:r>
-            <a:r>
-              <a:rPr lang="en-US" dirty="0" err="1"/>
+              <a:rPr lang="en-MY" dirty="0"/>
+              <a:t>Now, let’s dive right into the live demo.</a:t>
+            </a:r>
+          </a:p>
+          <a:p>
+            <a:endParaRPr lang="en-MY" dirty="0"/>
+          </a:p>
+          <a:p>
+            <a:endParaRPr lang="en-MY" dirty="0"/>
+          </a:p>
+          <a:p>
+            <a:r>
+              <a:rPr lang="en-MY" dirty="0"/>
+              <a:t>Conclusion:</a:t>
+            </a:r>
+          </a:p>
+          <a:p>
+            <a:r>
+              <a:rPr lang="en-MY" dirty="0"/>
+              <a:t>All in all, </a:t>
+            </a:r>
+            <a:r>
+              <a:rPr lang="en-MY" dirty="0" err="1"/>
               <a:t>GoVer</a:t>
             </a:r>
             <a:r>
-              <a:rPr lang="en-US" dirty="0"/>
-              <a:t>, our AI-powered blockchain government incentive platform. We leverage Aptos blockchain and inject the power of AI to make web3 easily accessible for every single Malaysian.</a:t>
+              <a:rPr lang="en-MY" dirty="0"/>
+              <a:t> isn’t just for the government, it is to bring Malaysia, a brighter, more transparent future.</a:t>
             </a:r>
           </a:p>
         </p:txBody>
@@ -856,119 +860,6 @@
             <a:fld id="{85CF7E7B-172A-AE4C-9E66-25F6D96D56FE}" type="slidenum">
               <a:rPr lang="en-US" smtClean="0"/>
               <a:t>4</a:t>
-            </a:fld>
-            <a:endParaRPr lang="en-US"/>
-          </a:p>
-        </p:txBody>
-      </p:sp>
-    </p:spTree>
-    <p:extLst>
-      <p:ext uri="{BB962C8B-B14F-4D97-AF65-F5344CB8AC3E}">
-        <p14:creationId xmlns:p14="http://schemas.microsoft.com/office/powerpoint/2010/main" val="856162272"/>
-      </p:ext>
-    </p:extLst>
-  </p:cSld>
-  <p:clrMapOvr>
-    <a:masterClrMapping/>
-  </p:clrMapOvr>
-</p:notes>
-</file>
-
-<file path=ppt/notesSlides/notesSlide5.xml><?xml version="1.0" encoding="utf-8"?>
-<p:notes xmlns:a="http://schemas.openxmlformats.org/drawingml/2006/main" xmlns:r="http://schemas.openxmlformats.org/officeDocument/2006/relationships" xmlns:p="http://schemas.openxmlformats.org/presentationml/2006/main">
-  <p:cSld>
-    <p:spTree>
-      <p:nvGrpSpPr>
-        <p:cNvPr id="1" name=""/>
-        <p:cNvGrpSpPr/>
-        <p:nvPr/>
-      </p:nvGrpSpPr>
-      <p:grpSpPr>
-        <a:xfrm>
-          <a:off x="0" y="0"/>
-          <a:ext cx="0" cy="0"/>
-          <a:chOff x="0" y="0"/>
-          <a:chExt cx="0" cy="0"/>
-        </a:xfrm>
-      </p:grpSpPr>
-      <p:sp>
-        <p:nvSpPr>
-          <p:cNvPr id="2" name="Slide Image Placeholder 1"/>
-          <p:cNvSpPr>
-            <a:spLocks noGrp="1" noRot="1" noChangeAspect="1"/>
-          </p:cNvSpPr>
-          <p:nvPr>
-            <p:ph type="sldImg"/>
-          </p:nvPr>
-        </p:nvSpPr>
-        <p:spPr/>
-      </p:sp>
-      <p:sp>
-        <p:nvSpPr>
-          <p:cNvPr id="3" name="Notes Placeholder 2"/>
-          <p:cNvSpPr>
-            <a:spLocks noGrp="1"/>
-          </p:cNvSpPr>
-          <p:nvPr>
-            <p:ph type="body" idx="1"/>
-          </p:nvPr>
-        </p:nvSpPr>
-        <p:spPr/>
-        <p:txBody>
-          <a:bodyPr/>
-          <a:lstStyle/>
-          <a:p>
-            <a:r>
-              <a:rPr lang="en-MY" dirty="0"/>
-              <a:t>Now, let’s dive right into the live demo.</a:t>
-            </a:r>
-          </a:p>
-          <a:p>
-            <a:endParaRPr lang="en-MY" dirty="0"/>
-          </a:p>
-          <a:p>
-            <a:endParaRPr lang="en-MY" dirty="0"/>
-          </a:p>
-          <a:p>
-            <a:r>
-              <a:rPr lang="en-MY" dirty="0"/>
-              <a:t>Conclusion:</a:t>
-            </a:r>
-          </a:p>
-          <a:p>
-            <a:r>
-              <a:rPr lang="en-MY" dirty="0"/>
-              <a:t>All in all, </a:t>
-            </a:r>
-            <a:r>
-              <a:rPr lang="en-MY" dirty="0" err="1"/>
-              <a:t>GoVer</a:t>
-            </a:r>
-            <a:r>
-              <a:rPr lang="en-MY" dirty="0"/>
-              <a:t> isn’t just for the government, it is to bring Malaysia, a brighter, more transparent future.</a:t>
-            </a:r>
-          </a:p>
-        </p:txBody>
-      </p:sp>
-      <p:sp>
-        <p:nvSpPr>
-          <p:cNvPr id="4" name="Slide Number Placeholder 3"/>
-          <p:cNvSpPr>
-            <a:spLocks noGrp="1"/>
-          </p:cNvSpPr>
-          <p:nvPr>
-            <p:ph type="sldNum" sz="quarter" idx="5"/>
-          </p:nvPr>
-        </p:nvSpPr>
-        <p:spPr/>
-        <p:txBody>
-          <a:bodyPr/>
-          <a:lstStyle/>
-          <a:p>
-            <a:fld id="{85CF7E7B-172A-AE4C-9E66-25F6D96D56FE}" type="slidenum">
-              <a:rPr lang="en-US" smtClean="0"/>
-              <a:t>5</a:t>
             </a:fld>
             <a:endParaRPr lang="en-US"/>
           </a:p>
@@ -4528,922 +4419,6 @@
       </p:grpSpPr>
       <p:sp>
         <p:nvSpPr>
-          <p:cNvPr id="4" name="Rectangle 3">
-            <a:extLst>
-              <a:ext uri="{FF2B5EF4-FFF2-40B4-BE49-F238E27FC236}">
-                <a16:creationId xmlns:a16="http://schemas.microsoft.com/office/drawing/2014/main" id="{0CB91975-30CE-9009-D0C5-EEF6282BB207}"/>
-              </a:ext>
-            </a:extLst>
-          </p:cNvPr>
-          <p:cNvSpPr/>
-          <p:nvPr/>
-        </p:nvSpPr>
-        <p:spPr>
-          <a:xfrm>
-            <a:off x="2" y="6316718"/>
-            <a:ext cx="10058398" cy="541282"/>
-          </a:xfrm>
-          <a:prstGeom prst="rect">
-            <a:avLst/>
-          </a:prstGeom>
-          <a:solidFill>
-            <a:schemeClr val="tx1"/>
-          </a:solidFill>
-        </p:spPr>
-        <p:style>
-          <a:lnRef idx="1">
-            <a:schemeClr val="accent1"/>
-          </a:lnRef>
-          <a:fillRef idx="3">
-            <a:schemeClr val="accent1"/>
-          </a:fillRef>
-          <a:effectRef idx="2">
-            <a:schemeClr val="accent1"/>
-          </a:effectRef>
-          <a:fontRef idx="minor">
-            <a:schemeClr val="lt1"/>
-          </a:fontRef>
-        </p:style>
-        <p:txBody>
-          <a:bodyPr rtlCol="0" anchor="ctr"/>
-          <a:lstStyle/>
-          <a:p>
-            <a:pPr algn="ctr"/>
-            <a:endParaRPr lang="en-US"/>
-          </a:p>
-        </p:txBody>
-      </p:sp>
-      <p:pic>
-        <p:nvPicPr>
-          <p:cNvPr id="5" name="Picture 2">
-            <a:extLst>
-              <a:ext uri="{FF2B5EF4-FFF2-40B4-BE49-F238E27FC236}">
-                <a16:creationId xmlns:a16="http://schemas.microsoft.com/office/drawing/2014/main" id="{A9E016A9-E0F7-D3FF-8BB7-0F0B44FE3772}"/>
-              </a:ext>
-            </a:extLst>
-          </p:cNvPr>
-          <p:cNvPicPr>
-            <a:picLocks noChangeAspect="1" noChangeArrowheads="1"/>
-          </p:cNvPicPr>
-          <p:nvPr/>
-        </p:nvPicPr>
-        <p:blipFill rotWithShape="1">
-          <a:blip r:embed="rId3">
-            <a:extLst>
-              <a:ext uri="{28A0092B-C50C-407E-A947-70E740481C1C}">
-                <a14:useLocalDpi xmlns:a14="http://schemas.microsoft.com/office/drawing/2010/main" val="0"/>
-              </a:ext>
-            </a:extLst>
-          </a:blip>
-          <a:srcRect l="34378" t="40993" r="34592" b="33272"/>
-          <a:stretch/>
-        </p:blipFill>
-        <p:spPr bwMode="auto">
-          <a:xfrm>
-            <a:off x="0" y="6316718"/>
-            <a:ext cx="1631576" cy="541282"/>
-          </a:xfrm>
-          <a:prstGeom prst="rect">
-            <a:avLst/>
-          </a:prstGeom>
-          <a:noFill/>
-          <a:extLst>
-            <a:ext uri="{909E8E84-426E-40DD-AFC4-6F175D3DCCD1}">
-              <a14:hiddenFill xmlns:a14="http://schemas.microsoft.com/office/drawing/2010/main">
-                <a:solidFill>
-                  <a:srgbClr val="FFFFFF"/>
-                </a:solidFill>
-              </a14:hiddenFill>
-            </a:ext>
-          </a:extLst>
-        </p:spPr>
-      </p:pic>
-      <p:sp>
-        <p:nvSpPr>
-          <p:cNvPr id="6" name="TextBox 5">
-            <a:extLst>
-              <a:ext uri="{FF2B5EF4-FFF2-40B4-BE49-F238E27FC236}">
-                <a16:creationId xmlns:a16="http://schemas.microsoft.com/office/drawing/2014/main" id="{42FF5AE4-9BE3-2A96-F0E3-2F6E3BEB9F81}"/>
-              </a:ext>
-            </a:extLst>
-          </p:cNvPr>
-          <p:cNvSpPr txBox="1"/>
-          <p:nvPr/>
-        </p:nvSpPr>
-        <p:spPr>
-          <a:xfrm>
-            <a:off x="8458347" y="6316718"/>
-            <a:ext cx="1600053" cy="584775"/>
-          </a:xfrm>
-          <a:prstGeom prst="rect">
-            <a:avLst/>
-          </a:prstGeom>
-          <a:noFill/>
-        </p:spPr>
-        <p:txBody>
-          <a:bodyPr wrap="none" rtlCol="0">
-            <a:spAutoFit/>
-          </a:bodyPr>
-          <a:lstStyle/>
-          <a:p>
-            <a:pPr algn="r"/>
-            <a:r>
-              <a:rPr lang="en-US" sz="1400" dirty="0">
-                <a:solidFill>
-                  <a:schemeClr val="bg1"/>
-                </a:solidFill>
-              </a:rPr>
-              <a:t>Brought to you by</a:t>
-            </a:r>
-          </a:p>
-          <a:p>
-            <a:pPr algn="r"/>
-            <a:r>
-              <a:rPr lang="en-US" b="1" dirty="0">
-                <a:solidFill>
-                  <a:schemeClr val="bg1"/>
-                </a:solidFill>
-              </a:rPr>
-              <a:t>HiddenFeature</a:t>
-            </a:r>
-          </a:p>
-        </p:txBody>
-      </p:sp>
-      <p:pic>
-        <p:nvPicPr>
-          <p:cNvPr id="7" name="Picture 6">
-            <a:extLst>
-              <a:ext uri="{FF2B5EF4-FFF2-40B4-BE49-F238E27FC236}">
-                <a16:creationId xmlns:a16="http://schemas.microsoft.com/office/drawing/2014/main" id="{4C5347EE-3533-D4EC-D2CF-914DE02EF40A}"/>
-              </a:ext>
-            </a:extLst>
-          </p:cNvPr>
-          <p:cNvPicPr>
-            <a:picLocks noChangeAspect="1"/>
-          </p:cNvPicPr>
-          <p:nvPr/>
-        </p:nvPicPr>
-        <p:blipFill>
-          <a:blip r:embed="rId4"/>
-          <a:stretch>
-            <a:fillRect/>
-          </a:stretch>
-        </p:blipFill>
-        <p:spPr>
-          <a:xfrm>
-            <a:off x="10229407" y="6186552"/>
-            <a:ext cx="1906062" cy="656608"/>
-          </a:xfrm>
-          <a:prstGeom prst="rect">
-            <a:avLst/>
-          </a:prstGeom>
-        </p:spPr>
-      </p:pic>
-      <p:pic>
-        <p:nvPicPr>
-          <p:cNvPr id="8" name="Picture 4" descr="Sustainable Development Goal 10 - Wikipedia">
-            <a:extLst>
-              <a:ext uri="{FF2B5EF4-FFF2-40B4-BE49-F238E27FC236}">
-                <a16:creationId xmlns:a16="http://schemas.microsoft.com/office/drawing/2014/main" id="{84F08DF6-433B-DC19-F0F4-01871692F68E}"/>
-              </a:ext>
-            </a:extLst>
-          </p:cNvPr>
-          <p:cNvPicPr>
-            <a:picLocks noChangeAspect="1" noChangeArrowheads="1"/>
-          </p:cNvPicPr>
-          <p:nvPr/>
-        </p:nvPicPr>
-        <p:blipFill>
-          <a:blip r:embed="rId5">
-            <a:extLst>
-              <a:ext uri="{28A0092B-C50C-407E-A947-70E740481C1C}">
-                <a14:useLocalDpi xmlns:a14="http://schemas.microsoft.com/office/drawing/2010/main" val="0"/>
-              </a:ext>
-            </a:extLst>
-          </a:blip>
-          <a:srcRect/>
-          <a:stretch>
-            <a:fillRect/>
-          </a:stretch>
-        </p:blipFill>
-        <p:spPr bwMode="auto">
-          <a:xfrm>
-            <a:off x="6387396" y="6324170"/>
-            <a:ext cx="539321" cy="539321"/>
-          </a:xfrm>
-          <a:prstGeom prst="rect">
-            <a:avLst/>
-          </a:prstGeom>
-          <a:noFill/>
-          <a:effectLst/>
-          <a:extLst>
-            <a:ext uri="{909E8E84-426E-40DD-AFC4-6F175D3DCCD1}">
-              <a14:hiddenFill xmlns:a14="http://schemas.microsoft.com/office/drawing/2010/main">
-                <a:solidFill>
-                  <a:srgbClr val="FFFFFF"/>
-                </a:solidFill>
-              </a14:hiddenFill>
-            </a:ext>
-          </a:extLst>
-        </p:spPr>
-      </p:pic>
-      <p:pic>
-        <p:nvPicPr>
-          <p:cNvPr id="9" name="Picture 6" descr="What Is Aptos? A New Ethereum Killer On the Rise">
-            <a:extLst>
-              <a:ext uri="{FF2B5EF4-FFF2-40B4-BE49-F238E27FC236}">
-                <a16:creationId xmlns:a16="http://schemas.microsoft.com/office/drawing/2014/main" id="{474920E6-AAEB-BC21-BD0F-AE768FF4C3F6}"/>
-              </a:ext>
-            </a:extLst>
-          </p:cNvPr>
-          <p:cNvPicPr>
-            <a:picLocks noChangeAspect="1" noChangeArrowheads="1"/>
-          </p:cNvPicPr>
-          <p:nvPr/>
-        </p:nvPicPr>
-        <p:blipFill rotWithShape="1">
-          <a:blip r:embed="rId6">
-            <a:extLst>
-              <a:ext uri="{28A0092B-C50C-407E-A947-70E740481C1C}">
-                <a14:useLocalDpi xmlns:a14="http://schemas.microsoft.com/office/drawing/2010/main" val="0"/>
-              </a:ext>
-            </a:extLst>
-          </a:blip>
-          <a:srcRect l="13310" t="23030" r="14276" b="30307"/>
-          <a:stretch/>
-        </p:blipFill>
-        <p:spPr bwMode="auto">
-          <a:xfrm>
-            <a:off x="1607562" y="6313543"/>
-            <a:ext cx="1523978" cy="549948"/>
-          </a:xfrm>
-          <a:prstGeom prst="rect">
-            <a:avLst/>
-          </a:prstGeom>
-          <a:noFill/>
-          <a:extLst>
-            <a:ext uri="{909E8E84-426E-40DD-AFC4-6F175D3DCCD1}">
-              <a14:hiddenFill xmlns:a14="http://schemas.microsoft.com/office/drawing/2010/main">
-                <a:solidFill>
-                  <a:srgbClr val="FFFFFF"/>
-                </a:solidFill>
-              </a14:hiddenFill>
-            </a:ext>
-          </a:extLst>
-        </p:spPr>
-      </p:pic>
-      <p:pic>
-        <p:nvPicPr>
-          <p:cNvPr id="10" name="Picture 8" descr="Sustainable Development Goal 1 - Wikipedia">
-            <a:extLst>
-              <a:ext uri="{FF2B5EF4-FFF2-40B4-BE49-F238E27FC236}">
-                <a16:creationId xmlns:a16="http://schemas.microsoft.com/office/drawing/2014/main" id="{5341FABB-494B-2508-58E8-501E8918F6E3}"/>
-              </a:ext>
-            </a:extLst>
-          </p:cNvPr>
-          <p:cNvPicPr>
-            <a:picLocks noChangeAspect="1" noChangeArrowheads="1"/>
-          </p:cNvPicPr>
-          <p:nvPr/>
-        </p:nvPicPr>
-        <p:blipFill>
-          <a:blip r:embed="rId7">
-            <a:extLst>
-              <a:ext uri="{28A0092B-C50C-407E-A947-70E740481C1C}">
-                <a14:useLocalDpi xmlns:a14="http://schemas.microsoft.com/office/drawing/2010/main" val="0"/>
-              </a:ext>
-            </a:extLst>
-          </a:blip>
-          <a:srcRect/>
-          <a:stretch>
-            <a:fillRect/>
-          </a:stretch>
-        </p:blipFill>
-        <p:spPr bwMode="auto">
-          <a:xfrm>
-            <a:off x="4760085" y="6316718"/>
-            <a:ext cx="543995" cy="543995"/>
-          </a:xfrm>
-          <a:prstGeom prst="rect">
-            <a:avLst/>
-          </a:prstGeom>
-          <a:noFill/>
-          <a:effectLst/>
-          <a:extLst>
-            <a:ext uri="{909E8E84-426E-40DD-AFC4-6F175D3DCCD1}">
-              <a14:hiddenFill xmlns:a14="http://schemas.microsoft.com/office/drawing/2010/main">
-                <a:solidFill>
-                  <a:srgbClr val="FFFFFF"/>
-                </a:solidFill>
-              </a14:hiddenFill>
-            </a:ext>
-          </a:extLst>
-        </p:spPr>
-      </p:pic>
-      <p:pic>
-        <p:nvPicPr>
-          <p:cNvPr id="11" name="Picture 10" descr="SDG 2: Zero Hunger | Sustainability, Sunway University">
-            <a:extLst>
-              <a:ext uri="{FF2B5EF4-FFF2-40B4-BE49-F238E27FC236}">
-                <a16:creationId xmlns:a16="http://schemas.microsoft.com/office/drawing/2014/main" id="{95FAF555-7897-8B37-2416-282646F1D2A9}"/>
-              </a:ext>
-            </a:extLst>
-          </p:cNvPr>
-          <p:cNvPicPr>
-            <a:picLocks noChangeAspect="1" noChangeArrowheads="1"/>
-          </p:cNvPicPr>
-          <p:nvPr/>
-        </p:nvPicPr>
-        <p:blipFill>
-          <a:blip r:embed="rId8">
-            <a:extLst>
-              <a:ext uri="{28A0092B-C50C-407E-A947-70E740481C1C}">
-                <a14:useLocalDpi xmlns:a14="http://schemas.microsoft.com/office/drawing/2010/main" val="0"/>
-              </a:ext>
-            </a:extLst>
-          </a:blip>
-          <a:srcRect/>
-          <a:stretch>
-            <a:fillRect/>
-          </a:stretch>
-        </p:blipFill>
-        <p:spPr bwMode="auto">
-          <a:xfrm>
-            <a:off x="5304080" y="6314005"/>
-            <a:ext cx="543995" cy="543995"/>
-          </a:xfrm>
-          <a:prstGeom prst="rect">
-            <a:avLst/>
-          </a:prstGeom>
-          <a:noFill/>
-          <a:effectLst/>
-          <a:extLst>
-            <a:ext uri="{909E8E84-426E-40DD-AFC4-6F175D3DCCD1}">
-              <a14:hiddenFill xmlns:a14="http://schemas.microsoft.com/office/drawing/2010/main">
-                <a:solidFill>
-                  <a:srgbClr val="FFFFFF"/>
-                </a:solidFill>
-              </a14:hiddenFill>
-            </a:ext>
-          </a:extLst>
-        </p:spPr>
-      </p:pic>
-      <p:pic>
-        <p:nvPicPr>
-          <p:cNvPr id="12" name="Picture 12" descr="Sustainable Development Goal 4 - Wikipedia">
-            <a:extLst>
-              <a:ext uri="{FF2B5EF4-FFF2-40B4-BE49-F238E27FC236}">
-                <a16:creationId xmlns:a16="http://schemas.microsoft.com/office/drawing/2014/main" id="{6BC67023-4579-DCE3-3E2F-878C332CA37F}"/>
-              </a:ext>
-            </a:extLst>
-          </p:cNvPr>
-          <p:cNvPicPr>
-            <a:picLocks noChangeAspect="1" noChangeArrowheads="1"/>
-          </p:cNvPicPr>
-          <p:nvPr/>
-        </p:nvPicPr>
-        <p:blipFill>
-          <a:blip r:embed="rId9">
-            <a:extLst>
-              <a:ext uri="{28A0092B-C50C-407E-A947-70E740481C1C}">
-                <a14:useLocalDpi xmlns:a14="http://schemas.microsoft.com/office/drawing/2010/main" val="0"/>
-              </a:ext>
-            </a:extLst>
-          </a:blip>
-          <a:srcRect/>
-          <a:stretch>
-            <a:fillRect/>
-          </a:stretch>
-        </p:blipFill>
-        <p:spPr bwMode="auto">
-          <a:xfrm>
-            <a:off x="5848075" y="6324171"/>
-            <a:ext cx="539321" cy="539321"/>
-          </a:xfrm>
-          <a:prstGeom prst="rect">
-            <a:avLst/>
-          </a:prstGeom>
-          <a:noFill/>
-          <a:effectLst/>
-          <a:extLst>
-            <a:ext uri="{909E8E84-426E-40DD-AFC4-6F175D3DCCD1}">
-              <a14:hiddenFill xmlns:a14="http://schemas.microsoft.com/office/drawing/2010/main">
-                <a:solidFill>
-                  <a:srgbClr val="FFFFFF"/>
-                </a:solidFill>
-              </a14:hiddenFill>
-            </a:ext>
-          </a:extLst>
-        </p:spPr>
-      </p:pic>
-      <p:pic>
-        <p:nvPicPr>
-          <p:cNvPr id="19" name="Picture 18">
-            <a:extLst>
-              <a:ext uri="{FF2B5EF4-FFF2-40B4-BE49-F238E27FC236}">
-                <a16:creationId xmlns:a16="http://schemas.microsoft.com/office/drawing/2014/main" id="{E9CB2E50-4CCF-03D8-1046-DBC6F1CBC2A4}"/>
-              </a:ext>
-            </a:extLst>
-          </p:cNvPr>
-          <p:cNvPicPr>
-            <a:picLocks noChangeAspect="1"/>
-          </p:cNvPicPr>
-          <p:nvPr/>
-        </p:nvPicPr>
-        <p:blipFill>
-          <a:blip r:embed="rId10"/>
-          <a:stretch>
-            <a:fillRect/>
-          </a:stretch>
-        </p:blipFill>
-        <p:spPr>
-          <a:xfrm>
-            <a:off x="3113227" y="6314401"/>
-            <a:ext cx="1671756" cy="544813"/>
-          </a:xfrm>
-          <a:prstGeom prst="rect">
-            <a:avLst/>
-          </a:prstGeom>
-          <a:ln>
-            <a:noFill/>
-          </a:ln>
-        </p:spPr>
-      </p:pic>
-      <p:sp>
-        <p:nvSpPr>
-          <p:cNvPr id="48" name="Rectangle 47">
-            <a:extLst>
-              <a:ext uri="{FF2B5EF4-FFF2-40B4-BE49-F238E27FC236}">
-                <a16:creationId xmlns:a16="http://schemas.microsoft.com/office/drawing/2014/main" id="{A794B991-E0FE-162D-DE9F-8D79792CA466}"/>
-              </a:ext>
-            </a:extLst>
-          </p:cNvPr>
-          <p:cNvSpPr/>
-          <p:nvPr/>
-        </p:nvSpPr>
-        <p:spPr>
-          <a:xfrm>
-            <a:off x="-1" y="0"/>
-            <a:ext cx="12192001" cy="699791"/>
-          </a:xfrm>
-          <a:prstGeom prst="rect">
-            <a:avLst/>
-          </a:prstGeom>
-          <a:solidFill>
-            <a:schemeClr val="bg1">
-              <a:lumMod val="85000"/>
-            </a:schemeClr>
-          </a:solidFill>
-          <a:ln>
-            <a:noFill/>
-          </a:ln>
-        </p:spPr>
-        <p:style>
-          <a:lnRef idx="2">
-            <a:schemeClr val="dk1">
-              <a:shade val="15000"/>
-            </a:schemeClr>
-          </a:lnRef>
-          <a:fillRef idx="1">
-            <a:schemeClr val="dk1"/>
-          </a:fillRef>
-          <a:effectRef idx="0">
-            <a:schemeClr val="dk1"/>
-          </a:effectRef>
-          <a:fontRef idx="minor">
-            <a:schemeClr val="lt1"/>
-          </a:fontRef>
-        </p:style>
-        <p:txBody>
-          <a:bodyPr rtlCol="0" anchor="ctr"/>
-          <a:lstStyle/>
-          <a:p>
-            <a:pPr algn="ctr"/>
-            <a:endParaRPr lang="en-US"/>
-          </a:p>
-        </p:txBody>
-      </p:sp>
-      <p:sp>
-        <p:nvSpPr>
-          <p:cNvPr id="49" name="TextBox 48">
-            <a:extLst>
-              <a:ext uri="{FF2B5EF4-FFF2-40B4-BE49-F238E27FC236}">
-                <a16:creationId xmlns:a16="http://schemas.microsoft.com/office/drawing/2014/main" id="{948CBEF1-22EC-C089-EB9B-D1B65FF2B16E}"/>
-              </a:ext>
-            </a:extLst>
-          </p:cNvPr>
-          <p:cNvSpPr txBox="1"/>
-          <p:nvPr/>
-        </p:nvSpPr>
-        <p:spPr>
-          <a:xfrm>
-            <a:off x="-1" y="53460"/>
-            <a:ext cx="12192001" cy="646331"/>
-          </a:xfrm>
-          <a:prstGeom prst="rect">
-            <a:avLst/>
-          </a:prstGeom>
-          <a:noFill/>
-        </p:spPr>
-        <p:txBody>
-          <a:bodyPr wrap="square" rtlCol="0">
-            <a:spAutoFit/>
-          </a:bodyPr>
-          <a:lstStyle/>
-          <a:p>
-            <a:pPr algn="ctr"/>
-            <a:r>
-              <a:rPr lang="en-US" sz="3600" b="1" dirty="0">
-                <a:latin typeface="Fira Sans Condensed Medium" panose="020B0603050000020004" pitchFamily="34" charset="0"/>
-              </a:rPr>
-              <a:t>Problem Statement</a:t>
-            </a:r>
-          </a:p>
-        </p:txBody>
-      </p:sp>
-      <p:sp>
-        <p:nvSpPr>
-          <p:cNvPr id="2" name="TextBox 1">
-            <a:extLst>
-              <a:ext uri="{FF2B5EF4-FFF2-40B4-BE49-F238E27FC236}">
-                <a16:creationId xmlns:a16="http://schemas.microsoft.com/office/drawing/2014/main" id="{CF034109-EEDB-9678-923C-9AF2F3A27653}"/>
-              </a:ext>
-            </a:extLst>
-          </p:cNvPr>
-          <p:cNvSpPr txBox="1"/>
-          <p:nvPr/>
-        </p:nvSpPr>
-        <p:spPr>
-          <a:xfrm>
-            <a:off x="1254063" y="2153460"/>
-            <a:ext cx="9554219" cy="2215991"/>
-          </a:xfrm>
-          <a:prstGeom prst="rect">
-            <a:avLst/>
-          </a:prstGeom>
-          <a:noFill/>
-        </p:spPr>
-        <p:txBody>
-          <a:bodyPr wrap="none" rtlCol="0">
-            <a:spAutoFit/>
-          </a:bodyPr>
-          <a:lstStyle/>
-          <a:p>
-            <a:r>
-              <a:rPr lang="en-US" sz="13800" b="1" dirty="0">
-                <a:solidFill>
-                  <a:srgbClr val="0070C0"/>
-                </a:solidFill>
-                <a:latin typeface="Graphik" panose="020B0503030202060203" pitchFamily="34" charset="77"/>
-              </a:rPr>
-              <a:t>RICH</a:t>
-            </a:r>
-            <a:r>
-              <a:rPr lang="en-US" sz="13800" b="1" dirty="0">
-                <a:latin typeface="Graphik" panose="020B0503030202060203" pitchFamily="34" charset="77"/>
-              </a:rPr>
-              <a:t> </a:t>
-            </a:r>
-            <a:r>
-              <a:rPr lang="en-US" sz="13800" b="1" dirty="0">
-                <a:solidFill>
-                  <a:srgbClr val="FF0000"/>
-                </a:solidFill>
-                <a:latin typeface="Graphik" panose="020B0503030202060203" pitchFamily="34" charset="77"/>
-              </a:rPr>
-              <a:t>           </a:t>
-            </a:r>
-            <a:r>
-              <a:rPr lang="en-US" sz="1600" b="1" dirty="0">
-                <a:solidFill>
-                  <a:srgbClr val="FF0000"/>
-                </a:solidFill>
-                <a:latin typeface="Graphik" panose="020B0503030202060203" pitchFamily="34" charset="77"/>
-              </a:rPr>
-              <a:t>group</a:t>
-            </a:r>
-            <a:endParaRPr lang="en-US" sz="13800" b="1" dirty="0">
-              <a:solidFill>
-                <a:srgbClr val="FF0000"/>
-              </a:solidFill>
-              <a:latin typeface="Graphik" panose="020B0503030202060203" pitchFamily="34" charset="77"/>
-            </a:endParaRPr>
-          </a:p>
-        </p:txBody>
-      </p:sp>
-      <p:sp>
-        <p:nvSpPr>
-          <p:cNvPr id="13" name="TextBox 12">
-            <a:extLst>
-              <a:ext uri="{FF2B5EF4-FFF2-40B4-BE49-F238E27FC236}">
-                <a16:creationId xmlns:a16="http://schemas.microsoft.com/office/drawing/2014/main" id="{4D4F10C1-8138-171F-5E9D-218C2FC7A58A}"/>
-              </a:ext>
-            </a:extLst>
-          </p:cNvPr>
-          <p:cNvSpPr txBox="1"/>
-          <p:nvPr/>
-        </p:nvSpPr>
-        <p:spPr>
-          <a:xfrm>
-            <a:off x="5012912" y="4632486"/>
-            <a:ext cx="2209644" cy="707886"/>
-          </a:xfrm>
-          <a:prstGeom prst="rect">
-            <a:avLst/>
-          </a:prstGeom>
-          <a:noFill/>
-        </p:spPr>
-        <p:txBody>
-          <a:bodyPr wrap="none" rtlCol="0">
-            <a:spAutoFit/>
-          </a:bodyPr>
-          <a:lstStyle/>
-          <a:p>
-            <a:r>
-              <a:rPr lang="en-US" sz="4000" b="1" dirty="0"/>
-              <a:t>Not Fair!!</a:t>
-            </a:r>
-          </a:p>
-        </p:txBody>
-      </p:sp>
-      <p:sp>
-        <p:nvSpPr>
-          <p:cNvPr id="14" name="TextBox 13">
-            <a:extLst>
-              <a:ext uri="{FF2B5EF4-FFF2-40B4-BE49-F238E27FC236}">
-                <a16:creationId xmlns:a16="http://schemas.microsoft.com/office/drawing/2014/main" id="{B53327BD-F48C-52FA-447E-33D0997351CE}"/>
-              </a:ext>
-            </a:extLst>
-          </p:cNvPr>
-          <p:cNvSpPr txBox="1"/>
-          <p:nvPr/>
-        </p:nvSpPr>
-        <p:spPr>
-          <a:xfrm>
-            <a:off x="6476702" y="2109967"/>
-            <a:ext cx="4209949" cy="523220"/>
-          </a:xfrm>
-          <a:prstGeom prst="rect">
-            <a:avLst/>
-          </a:prstGeom>
-          <a:noFill/>
-        </p:spPr>
-        <p:txBody>
-          <a:bodyPr wrap="square" rtlCol="0">
-            <a:spAutoFit/>
-          </a:bodyPr>
-          <a:lstStyle/>
-          <a:p>
-            <a:r>
-              <a:rPr lang="en-MY" sz="1400" b="1" i="0" dirty="0">
-                <a:solidFill>
-                  <a:srgbClr val="1F1F1F"/>
-                </a:solidFill>
-                <a:effectLst/>
-                <a:latin typeface="Google Sans"/>
-              </a:rPr>
-              <a:t>B40 represents the </a:t>
-            </a:r>
-            <a:r>
-              <a:rPr lang="en-MY" sz="1400" b="1" i="0" dirty="0">
-                <a:solidFill>
-                  <a:srgbClr val="040C28"/>
-                </a:solidFill>
-                <a:effectLst/>
-                <a:latin typeface="Google Sans"/>
-              </a:rPr>
-              <a:t>bottom-tier (40%) households that have an income of approximate below than RM 4,850</a:t>
-            </a:r>
-            <a:r>
-              <a:rPr lang="en-MY" sz="1400" b="1" i="0" dirty="0">
-                <a:solidFill>
-                  <a:srgbClr val="1F1F1F"/>
-                </a:solidFill>
-                <a:effectLst/>
-                <a:latin typeface="Google Sans"/>
-              </a:rPr>
-              <a:t>.</a:t>
-            </a:r>
-            <a:endParaRPr lang="en-US" sz="1400" b="1" dirty="0"/>
-          </a:p>
-        </p:txBody>
-      </p:sp>
-      <p:sp>
-        <p:nvSpPr>
-          <p:cNvPr id="16" name="TextBox 15">
-            <a:extLst>
-              <a:ext uri="{FF2B5EF4-FFF2-40B4-BE49-F238E27FC236}">
-                <a16:creationId xmlns:a16="http://schemas.microsoft.com/office/drawing/2014/main" id="{9AF6AF8C-D848-3382-1AC1-1FEDDAECB872}"/>
-              </a:ext>
-            </a:extLst>
-          </p:cNvPr>
-          <p:cNvSpPr txBox="1"/>
-          <p:nvPr/>
-        </p:nvSpPr>
-        <p:spPr>
-          <a:xfrm>
-            <a:off x="6353373" y="2253198"/>
-            <a:ext cx="4209948" cy="2215991"/>
-          </a:xfrm>
-          <a:prstGeom prst="rect">
-            <a:avLst/>
-          </a:prstGeom>
-          <a:noFill/>
-        </p:spPr>
-        <p:txBody>
-          <a:bodyPr wrap="square">
-            <a:spAutoFit/>
-          </a:bodyPr>
-          <a:lstStyle/>
-          <a:p>
-            <a:r>
-              <a:rPr lang="en-US" sz="13800" b="1" dirty="0">
-                <a:solidFill>
-                  <a:srgbClr val="FF0000"/>
-                </a:solidFill>
-                <a:latin typeface="Graphik" panose="020B0503030202060203" pitchFamily="34" charset="77"/>
-              </a:rPr>
-              <a:t>B40</a:t>
-            </a:r>
-            <a:endParaRPr lang="en-US" sz="2400" dirty="0"/>
-          </a:p>
-        </p:txBody>
-      </p:sp>
-      <p:cxnSp>
-        <p:nvCxnSpPr>
-          <p:cNvPr id="18" name="Straight Connector 17">
-            <a:extLst>
-              <a:ext uri="{FF2B5EF4-FFF2-40B4-BE49-F238E27FC236}">
-                <a16:creationId xmlns:a16="http://schemas.microsoft.com/office/drawing/2014/main" id="{5A1999DD-7397-7955-2657-33831702A16D}"/>
-              </a:ext>
-            </a:extLst>
-          </p:cNvPr>
-          <p:cNvCxnSpPr/>
-          <p:nvPr/>
-        </p:nvCxnSpPr>
-        <p:spPr>
-          <a:xfrm flipV="1">
-            <a:off x="1254063" y="2572638"/>
-            <a:ext cx="4841937" cy="1610256"/>
-          </a:xfrm>
-          <a:prstGeom prst="line">
-            <a:avLst/>
-          </a:prstGeom>
-          <a:ln w="76200"/>
-        </p:spPr>
-        <p:style>
-          <a:lnRef idx="2">
-            <a:schemeClr val="dk1"/>
-          </a:lnRef>
-          <a:fillRef idx="0">
-            <a:schemeClr val="dk1"/>
-          </a:fillRef>
-          <a:effectRef idx="1">
-            <a:schemeClr val="dk1"/>
-          </a:effectRef>
-          <a:fontRef idx="minor">
-            <a:schemeClr val="tx1"/>
-          </a:fontRef>
-        </p:style>
-      </p:cxnSp>
-      <p:sp>
-        <p:nvSpPr>
-          <p:cNvPr id="22" name="Rectangle 21">
-            <a:extLst>
-              <a:ext uri="{FF2B5EF4-FFF2-40B4-BE49-F238E27FC236}">
-                <a16:creationId xmlns:a16="http://schemas.microsoft.com/office/drawing/2014/main" id="{F502C252-9DA1-E04A-02FE-68F39FCD8150}"/>
-              </a:ext>
-            </a:extLst>
-          </p:cNvPr>
-          <p:cNvSpPr/>
-          <p:nvPr/>
-        </p:nvSpPr>
-        <p:spPr>
-          <a:xfrm rot="20885741">
-            <a:off x="1116892" y="2155613"/>
-            <a:ext cx="1970757" cy="631026"/>
-          </a:xfrm>
-          <a:prstGeom prst="rect">
-            <a:avLst/>
-          </a:prstGeom>
-          <a:solidFill>
-            <a:srgbClr val="94ECA2"/>
-          </a:solidFill>
-        </p:spPr>
-        <p:style>
-          <a:lnRef idx="1">
-            <a:schemeClr val="accent1"/>
-          </a:lnRef>
-          <a:fillRef idx="3">
-            <a:schemeClr val="accent1"/>
-          </a:fillRef>
-          <a:effectRef idx="2">
-            <a:schemeClr val="accent1"/>
-          </a:effectRef>
-          <a:fontRef idx="minor">
-            <a:schemeClr val="lt1"/>
-          </a:fontRef>
-        </p:style>
-        <p:txBody>
-          <a:bodyPr rtlCol="0" anchor="ctr"/>
-          <a:lstStyle/>
-          <a:p>
-            <a:pPr algn="ctr"/>
-            <a:endParaRPr lang="en-US"/>
-          </a:p>
-        </p:txBody>
-      </p:sp>
-      <p:sp>
-        <p:nvSpPr>
-          <p:cNvPr id="20" name="TextBox 19">
-            <a:extLst>
-              <a:ext uri="{FF2B5EF4-FFF2-40B4-BE49-F238E27FC236}">
-                <a16:creationId xmlns:a16="http://schemas.microsoft.com/office/drawing/2014/main" id="{8B09BE92-0BBC-CDF3-EE0B-DD6D73519ADB}"/>
-              </a:ext>
-            </a:extLst>
-          </p:cNvPr>
-          <p:cNvSpPr txBox="1"/>
-          <p:nvPr/>
-        </p:nvSpPr>
-        <p:spPr>
-          <a:xfrm rot="20919589">
-            <a:off x="1482181" y="2086405"/>
-            <a:ext cx="1239442" cy="769441"/>
-          </a:xfrm>
-          <a:prstGeom prst="rect">
-            <a:avLst/>
-          </a:prstGeom>
-          <a:noFill/>
-        </p:spPr>
-        <p:txBody>
-          <a:bodyPr wrap="none" rtlCol="0">
-            <a:spAutoFit/>
-          </a:bodyPr>
-          <a:lstStyle/>
-          <a:p>
-            <a:r>
-              <a:rPr lang="en-US" sz="4400" b="1" dirty="0">
-                <a:latin typeface="Fira Sans Condensed SemiBold" panose="020B0603050000020004" pitchFamily="34" charset="0"/>
-              </a:rPr>
-              <a:t>True</a:t>
-            </a:r>
-          </a:p>
-        </p:txBody>
-      </p:sp>
-    </p:spTree>
-    <p:extLst>
-      <p:ext uri="{BB962C8B-B14F-4D97-AF65-F5344CB8AC3E}">
-        <p14:creationId xmlns:p14="http://schemas.microsoft.com/office/powerpoint/2010/main" val="3301809595"/>
-      </p:ext>
-    </p:extLst>
-  </p:cSld>
-  <p:clrMapOvr>
-    <a:masterClrMapping/>
-  </p:clrMapOvr>
-  <mc:AlternateContent xmlns:mc="http://schemas.openxmlformats.org/markup-compatibility/2006" xmlns:p159="http://schemas.microsoft.com/office/powerpoint/2015/09/main">
-    <mc:Choice Requires="p159">
-      <p:transition spd="slow">
-        <p159:morph option="byObject"/>
-      </p:transition>
-    </mc:Choice>
-    <mc:Fallback xmlns="">
-      <p:transition spd="slow">
-        <p:fade/>
-      </p:transition>
-    </mc:Fallback>
-  </mc:AlternateContent>
-</p:sld>
-</file>
-
-<file path=ppt/slides/slide3.xml><?xml version="1.0" encoding="utf-8"?>
-<p:sld xmlns:a="http://schemas.openxmlformats.org/drawingml/2006/main" xmlns:r="http://schemas.openxmlformats.org/officeDocument/2006/relationships" xmlns:p="http://schemas.openxmlformats.org/presentationml/2006/main">
-  <p:cSld>
-    <p:bg>
-      <p:bgPr>
-        <a:solidFill>
-          <a:schemeClr val="bg1">
-            <a:lumMod val="95000"/>
-          </a:schemeClr>
-        </a:solidFill>
-        <a:effectLst/>
-      </p:bgPr>
-    </p:bg>
-    <p:spTree>
-      <p:nvGrpSpPr>
-        <p:cNvPr id="1" name=""/>
-        <p:cNvGrpSpPr/>
-        <p:nvPr/>
-      </p:nvGrpSpPr>
-      <p:grpSpPr>
-        <a:xfrm>
-          <a:off x="0" y="0"/>
-          <a:ext cx="0" cy="0"/>
-          <a:chOff x="0" y="0"/>
-          <a:chExt cx="0" cy="0"/>
-        </a:xfrm>
-      </p:grpSpPr>
-      <p:sp>
-        <p:nvSpPr>
           <p:cNvPr id="53" name="Rounded Rectangle 52">
             <a:extLst>
               <a:ext uri="{FF2B5EF4-FFF2-40B4-BE49-F238E27FC236}">
@@ -6933,7 +5908,7 @@
 </p:sld>
 </file>
 
-<file path=ppt/slides/slide4.xml><?xml version="1.0" encoding="utf-8"?>
+<file path=ppt/slides/slide3.xml><?xml version="1.0" encoding="utf-8"?>
 <p:sld xmlns:a="http://schemas.openxmlformats.org/drawingml/2006/main" xmlns:r="http://schemas.openxmlformats.org/officeDocument/2006/relationships" xmlns:p="http://schemas.openxmlformats.org/presentationml/2006/main">
   <p:cSld>
     <p:bg>
@@ -8812,7 +7787,7 @@
 </p:sld>
 </file>
 
-<file path=ppt/slides/slide5.xml><?xml version="1.0" encoding="utf-8"?>
+<file path=ppt/slides/slide4.xml><?xml version="1.0" encoding="utf-8"?>
 <p:sld xmlns:a="http://schemas.openxmlformats.org/drawingml/2006/main" xmlns:r="http://schemas.openxmlformats.org/officeDocument/2006/relationships" xmlns:p="http://schemas.openxmlformats.org/presentationml/2006/main">
   <p:cSld>
     <p:bg>

</xml_diff>

<commit_message>
modified:   pitch/PitchSlide.pdf 	modified:   pitch/PitchSlide.pptx 	modified:   readme.MD
Changes not staged for commit:
	modified:   backend/aptos-python-sdk (modified content, untracked content)
</commit_message>
<xml_diff>
--- a/pitch/PitchSlide.pptx
+++ b/pitch/PitchSlide.pptx
@@ -607,30 +607,10 @@
           <a:bodyPr/>
           <a:lstStyle/>
           <a:p>
-            <a:pPr marL="0" marR="0" lvl="0" indent="0" algn="l" defTabSz="914400" rtl="0" eaLnBrk="1" fontAlgn="auto" latinLnBrk="0" hangingPunct="1">
-              <a:lnSpc>
-                <a:spcPct val="100000"/>
-              </a:lnSpc>
-              <a:spcBef>
-                <a:spcPts val="0"/>
-              </a:spcBef>
-              <a:spcAft>
-                <a:spcPts val="0"/>
-              </a:spcAft>
-              <a:buClrTx/>
-              <a:buSzTx/>
-              <a:buFontTx/>
-              <a:buNone/>
-              <a:tabLst/>
-              <a:defRPr/>
-            </a:pPr>
             <a:r>
               <a:rPr lang="en-US" dirty="0"/>
-              <a:t>Current government incentive platforms are not only slow, but also lack transparency. </a:t>
-            </a:r>
-          </a:p>
-          <a:p>
-            <a:endParaRPr lang="en-US" dirty="0"/>
+              <a:t>How many times have you been frustrated over the tedious process of applying for government incentives? Current government platforms are not only slow, but also lack transparency.</a:t>
+            </a:r>
           </a:p>
         </p:txBody>
       </p:sp>
@@ -3878,6 +3858,11 @@
           <a:solidFill>
             <a:schemeClr val="tx1"/>
           </a:solidFill>
+          <a:ln>
+            <a:solidFill>
+              <a:schemeClr val="tx1"/>
+            </a:solidFill>
+          </a:ln>
         </p:spPr>
         <p:style>
           <a:lnRef idx="1">
@@ -4493,6 +4478,11 @@
           <a:solidFill>
             <a:schemeClr val="tx1"/>
           </a:solidFill>
+          <a:ln>
+            <a:solidFill>
+              <a:schemeClr val="tx1"/>
+            </a:solidFill>
+          </a:ln>
         </p:spPr>
         <p:style>
           <a:lnRef idx="1">
@@ -6794,6 +6784,11 @@
           <a:solidFill>
             <a:schemeClr val="tx1"/>
           </a:solidFill>
+          <a:ln>
+            <a:solidFill>
+              <a:schemeClr val="tx1"/>
+            </a:solidFill>
+          </a:ln>
         </p:spPr>
         <p:style>
           <a:lnRef idx="1">
@@ -7700,8 +7695,8 @@
         </p:nvSpPr>
         <p:spPr>
           <a:xfrm>
-            <a:off x="10349472" y="5099810"/>
-            <a:ext cx="1665931" cy="954107"/>
+            <a:off x="10398578" y="4712274"/>
+            <a:ext cx="1665931" cy="1708160"/>
           </a:xfrm>
           <a:prstGeom prst="rect">
             <a:avLst/>
@@ -7750,15 +7745,44 @@
             <a:pPr algn="r"/>
             <a:r>
               <a:rPr lang="en-US" sz="700" dirty="0"/>
-              <a:t>Sample Transaction: </a:t>
+              <a:t>Apply: </a:t>
             </a:r>
             <a:br>
               <a:rPr lang="en-US" sz="700" dirty="0"/>
             </a:br>
             <a:r>
               <a:rPr lang="en-US" sz="700" dirty="0"/>
-              <a:t>0x6b0d457256555c3e687983b6ca7318e719946e4bee2c5825629f2bc41084aee6</a:t>
-            </a:r>
+              <a:t>0x425e23802282cc1c42662caf094f210059869b5246ca31a84c54f09d83e512e2</a:t>
+            </a:r>
+          </a:p>
+          <a:p>
+            <a:pPr algn="r"/>
+            <a:r>
+              <a:rPr lang="en-US" sz="700" dirty="0"/>
+              <a:t>0x99b51777825acd711bbe0a203f6c4e5b0ac24dadd303763627adccba2279a83a</a:t>
+            </a:r>
+          </a:p>
+          <a:p>
+            <a:pPr algn="r"/>
+            <a:endParaRPr lang="en-US" sz="700" dirty="0"/>
+          </a:p>
+          <a:p>
+            <a:pPr algn="r"/>
+            <a:r>
+              <a:rPr lang="en-US" sz="700" dirty="0"/>
+              <a:t>Sponsor:</a:t>
+            </a:r>
+          </a:p>
+          <a:p>
+            <a:pPr algn="r"/>
+            <a:r>
+              <a:rPr lang="en-US" sz="700" dirty="0"/>
+              <a:t>0x38563d5b4123b5cb164b2b33f26c669fdd2024aff1e7b456bcd7c07350fc7948</a:t>
+            </a:r>
+          </a:p>
+          <a:p>
+            <a:pPr algn="r"/>
+            <a:endParaRPr lang="en-US" sz="700" dirty="0"/>
           </a:p>
         </p:txBody>
       </p:sp>
@@ -7837,6 +7861,11 @@
           <a:solidFill>
             <a:schemeClr val="tx1"/>
           </a:solidFill>
+          <a:ln>
+            <a:solidFill>
+              <a:schemeClr val="tx1"/>
+            </a:solidFill>
+          </a:ln>
         </p:spPr>
         <p:style>
           <a:lnRef idx="1">

</xml_diff>